<commit_message>
add slides and LaTeX example
</commit_message>
<xml_diff>
--- a/03_rmarkdown/03c_ppt.pptx
+++ b/03_rmarkdown/03c_ppt.pptx
@@ -16751,259 +16751,355 @@
           <a:chExt cx="0" cy="0"/>
         </a:xfrm>
       </p:grpSpPr>
-      <p:sp>
-        <p:nvSpPr>
-          <p:cNvPr id="3" name="Content Placeholder 2"/>
-          <p:cNvSpPr>
-            <a:spLocks noGrp="1"/>
-          </p:cNvSpPr>
-          <p:nvPr>
-            <p:ph idx="1"/>
-          </p:nvPr>
-        </p:nvSpPr>
-        <p:spPr/>
-        <p:txBody>
-          <a:bodyPr/>
-          <a:lstStyle/>
-          <a:p>
-            <a:pPr lvl="0" marL="0" indent="0">
-              <a:buNone/>
-            </a:pPr>
-            <a:r>
-              <a:rPr/>
-              <a:t>As you can see throughout this document, you can do a lot of things with Markdown, including:</a:t>
-            </a:r>
-          </a:p>
-          <a:p>
-            <a:pPr lvl="1"/>
-            <a:r>
-              <a:rPr i="1"/>
-              <a:t>Italicize</a:t>
-            </a:r>
-            <a:r>
-              <a:rPr/>
-              <a:t> text by surrounding it with single underscores (</a:t>
-            </a:r>
-            <a:r>
-              <a:rPr sz="1800">
-                <a:latin typeface="Courier"/>
-              </a:rPr>
-              <a:t>_</a:t>
-            </a:r>
-            <a:r>
-              <a:rPr/>
-              <a:t>text</a:t>
-            </a:r>
-            <a:r>
-              <a:rPr sz="1800">
-                <a:latin typeface="Courier"/>
-              </a:rPr>
-              <a:t>_</a:t>
-            </a:r>
-            <a:r>
-              <a:rPr/>
-              <a:t>) or asterisks (</a:t>
-            </a:r>
-            <a:r>
-              <a:rPr sz="1800">
-                <a:latin typeface="Courier"/>
-              </a:rPr>
-              <a:t>*</a:t>
-            </a:r>
-            <a:r>
-              <a:rPr/>
-              <a:t>text</a:t>
-            </a:r>
-            <a:r>
-              <a:rPr sz="1800">
-                <a:latin typeface="Courier"/>
-              </a:rPr>
-              <a:t>*</a:t>
-            </a:r>
-            <a:r>
-              <a:rPr/>
-              <a:t>)</a:t>
-            </a:r>
-          </a:p>
-          <a:p>
-            <a:pPr lvl="1"/>
-            <a:r>
-              <a:rPr b="1"/>
-              <a:t>Bold</a:t>
-            </a:r>
-            <a:r>
-              <a:rPr/>
-              <a:t> text by surrounding it with double asterisks (</a:t>
-            </a:r>
-            <a:r>
-              <a:rPr sz="1800">
-                <a:latin typeface="Courier"/>
-              </a:rPr>
-              <a:t>**</a:t>
-            </a:r>
-            <a:r>
-              <a:rPr/>
-              <a:t>text</a:t>
-            </a:r>
-            <a:r>
-              <a:rPr sz="1800">
-                <a:latin typeface="Courier"/>
-              </a:rPr>
-              <a:t>**</a:t>
-            </a:r>
-            <a:r>
-              <a:rPr/>
-              <a:t>)</a:t>
-            </a:r>
-          </a:p>
-          <a:p>
-            <a:pPr lvl="1"/>
-            <a:r>
-              <a:rPr/>
-              <a:t>Insert </a:t>
-            </a:r>
-            <a:r>
-              <a:rPr>
-                <a:hlinkClick r:id="rId2"/>
-              </a:rPr>
-              <a:t>links</a:t>
-            </a:r>
-            <a:r>
-              <a:rPr/>
-              <a:t> with </a:t>
-            </a:r>
-            <a:r>
-              <a:rPr sz="1800">
-                <a:latin typeface="Courier"/>
-              </a:rPr>
-              <a:t>[some text](https://www.rstudio.com/)</a:t>
-            </a:r>
-          </a:p>
-          <a:p>
-            <a:pPr lvl="1"/>
-            <a:r>
-              <a:rPr sz="1800">
-                <a:latin typeface="Courier"/>
-              </a:rPr>
-              <a:t>Render text as inline code</a:t>
-            </a:r>
-            <a:r>
-              <a:rPr/>
-              <a:t> with single tick marks</a:t>
-            </a:r>
-          </a:p>
-          <a:p>
-            <a:pPr lvl="0" marL="0" indent="0">
-              <a:buNone/>
-            </a:pPr>
-            <a:r>
-              <a:rPr sz="1800">
-                <a:latin typeface="Courier"/>
-              </a:rPr>
-              <a:t>* Render text as code blocks with triple tick marks</a:t>
-            </a:r>
-          </a:p>
-          <a:p>
-            <a:pPr lvl="1"/>
-            <a:r>
-              <a:rPr/>
-              <a:t>Create section headings with </a:t>
-            </a:r>
-            <a:r>
-              <a:rPr sz="1800">
-                <a:latin typeface="Courier"/>
-              </a:rPr>
-              <a:t>#</a:t>
-            </a:r>
-            <a:r>
-              <a:rPr/>
-              <a:t> (and subheadings with </a:t>
-            </a:r>
-            <a:r>
-              <a:rPr sz="1800">
-                <a:latin typeface="Courier"/>
-              </a:rPr>
-              <a:t>##</a:t>
-            </a:r>
-            <a:r>
-              <a:rPr/>
-              <a:t>, </a:t>
-            </a:r>
-            <a:r>
-              <a:rPr sz="1800">
-                <a:latin typeface="Courier"/>
-              </a:rPr>
-              <a:t>###</a:t>
-            </a:r>
-            <a:r>
-              <a:rPr/>
-              <a:t>, </a:t>
-            </a:r>
-            <a:r>
-              <a:rPr sz="1800">
-                <a:latin typeface="Courier"/>
-              </a:rPr>
-              <a:t>####</a:t>
-            </a:r>
-            <a:r>
-              <a:rPr/>
-              <a:t>, …)</a:t>
-            </a:r>
-          </a:p>
-          <a:p>
-            <a:pPr lvl="1"/>
-            <a:r>
-              <a:rPr/>
-              <a:t>Create ordered lists with 1., 2., 3., … and unordered lists with </a:t>
-            </a:r>
-            <a:r>
-              <a:rPr sz="1800">
-                <a:latin typeface="Courier"/>
-              </a:rPr>
-              <a:t>*</a:t>
-            </a:r>
-            <a:r>
-              <a:rPr/>
-              <a:t>, </a:t>
-            </a:r>
-            <a:r>
-              <a:rPr sz="1800">
-                <a:latin typeface="Courier"/>
-              </a:rPr>
-              <a:t>-</a:t>
-            </a:r>
-            <a:r>
-              <a:rPr/>
-              <a:t>, or </a:t>
-            </a:r>
-            <a:r>
-              <a:rPr sz="1800">
-                <a:latin typeface="Courier"/>
-              </a:rPr>
-              <a:t>+</a:t>
-            </a:r>
-          </a:p>
-          <a:p>
-            <a:pPr lvl="1"/>
-            <a:r>
-              <a:rPr/>
-              <a:t>Create footnotes with </a:t>
-            </a:r>
-            <a:r>
-              <a:rPr sz="1800">
-                <a:latin typeface="Courier"/>
-              </a:rPr>
-              <a:t>^[]</a:t>
-            </a:r>
-            <a:r>
-              <a:rPr baseline="30000">
-                <a:hlinkClick r:id="rId3" action="ppaction://hlinksldjump"/>
-              </a:rPr>
-              <a:t>2</a:t>
-            </a:r>
-          </a:p>
-        </p:txBody>
-      </p:sp>
+      <mc:AlternateContent xmlns:mc="http://schemas.openxmlformats.org/markup-compatibility/2006">
+        <mc:Choice xmlns:a14="http://schemas.microsoft.com/office/drawing/2010/main" Requires="a14">
+          <p:sp>
+            <p:nvSpPr>
+              <p:cNvPr id="3" name="Content Placeholder 2"/>
+              <p:cNvSpPr>
+                <a:spLocks noGrp="1"/>
+              </p:cNvSpPr>
+              <p:nvPr>
+                <p:ph idx="1"/>
+              </p:nvPr>
+            </p:nvSpPr>
+            <p:spPr/>
+            <p:txBody>
+              <a:bodyPr/>
+              <a:lstStyle/>
+              <a:p>
+                <a:pPr lvl="0" marL="0" indent="0">
+                  <a:buNone/>
+                </a:pPr>
+                <a:r>
+                  <a:rPr/>
+                  <a:t>As you can see throughout this document, you can do a lot of things with Markdown, including:</a:t>
+                </a:r>
+              </a:p>
+              <a:p>
+                <a:pPr lvl="1"/>
+                <a:r>
+                  <a:rPr i="1"/>
+                  <a:t>Italicize</a:t>
+                </a:r>
+                <a:r>
+                  <a:rPr/>
+                  <a:t> text by surrounding it with single underscores (</a:t>
+                </a:r>
+                <a:r>
+                  <a:rPr sz="1800">
+                    <a:latin typeface="Courier"/>
+                  </a:rPr>
+                  <a:t>_</a:t>
+                </a:r>
+                <a:r>
+                  <a:rPr/>
+                  <a:t>text</a:t>
+                </a:r>
+                <a:r>
+                  <a:rPr sz="1800">
+                    <a:latin typeface="Courier"/>
+                  </a:rPr>
+                  <a:t>_</a:t>
+                </a:r>
+                <a:r>
+                  <a:rPr/>
+                  <a:t>) or asterisks (</a:t>
+                </a:r>
+                <a:r>
+                  <a:rPr sz="1800">
+                    <a:latin typeface="Courier"/>
+                  </a:rPr>
+                  <a:t>*</a:t>
+                </a:r>
+                <a:r>
+                  <a:rPr/>
+                  <a:t>text</a:t>
+                </a:r>
+                <a:r>
+                  <a:rPr sz="1800">
+                    <a:latin typeface="Courier"/>
+                  </a:rPr>
+                  <a:t>*</a:t>
+                </a:r>
+                <a:r>
+                  <a:rPr/>
+                  <a:t>)</a:t>
+                </a:r>
+              </a:p>
+              <a:p>
+                <a:pPr lvl="1"/>
+                <a:r>
+                  <a:rPr b="1"/>
+                  <a:t>Bold</a:t>
+                </a:r>
+                <a:r>
+                  <a:rPr/>
+                  <a:t> text by surrounding it with double asterisks (</a:t>
+                </a:r>
+                <a:r>
+                  <a:rPr sz="1800">
+                    <a:latin typeface="Courier"/>
+                  </a:rPr>
+                  <a:t>**</a:t>
+                </a:r>
+                <a:r>
+                  <a:rPr/>
+                  <a:t>text</a:t>
+                </a:r>
+                <a:r>
+                  <a:rPr sz="1800">
+                    <a:latin typeface="Courier"/>
+                  </a:rPr>
+                  <a:t>**</a:t>
+                </a:r>
+                <a:r>
+                  <a:rPr/>
+                  <a:t>)</a:t>
+                </a:r>
+              </a:p>
+              <a:p>
+                <a:pPr lvl="1"/>
+                <a:r>
+                  <a:rPr/>
+                  <a:t>Insert </a:t>
+                </a:r>
+                <a:r>
+                  <a:rPr>
+                    <a:hlinkClick r:id="rId2"/>
+                  </a:rPr>
+                  <a:t>links</a:t>
+                </a:r>
+                <a:r>
+                  <a:rPr/>
+                  <a:t> with </a:t>
+                </a:r>
+                <a:r>
+                  <a:rPr sz="1800">
+                    <a:latin typeface="Courier"/>
+                  </a:rPr>
+                  <a:t>[some text](https://www.rstudio.com/)</a:t>
+                </a:r>
+              </a:p>
+              <a:p>
+                <a:pPr lvl="1"/>
+                <a:r>
+                  <a:rPr sz="1800">
+                    <a:latin typeface="Courier"/>
+                  </a:rPr>
+                  <a:t>Render text as inline code</a:t>
+                </a:r>
+                <a:r>
+                  <a:rPr/>
+                  <a:t> with single tick marks</a:t>
+                </a:r>
+              </a:p>
+              <a:p>
+                <a:pPr lvl="0" marL="0" indent="0">
+                  <a:buNone/>
+                </a:pPr>
+                <a:r>
+                  <a:rPr sz="1800">
+                    <a:latin typeface="Courier"/>
+                  </a:rPr>
+                  <a:t>* Render text as code blocks with triple tick marks</a:t>
+                </a:r>
+              </a:p>
+              <a:p>
+                <a:pPr lvl="1"/>
+                <a:r>
+                  <a:rPr/>
+                  <a:t>Create section headings with </a:t>
+                </a:r>
+                <a:r>
+                  <a:rPr sz="1800">
+                    <a:latin typeface="Courier"/>
+                  </a:rPr>
+                  <a:t>#</a:t>
+                </a:r>
+                <a:r>
+                  <a:rPr/>
+                  <a:t> (and subheadings with </a:t>
+                </a:r>
+                <a:r>
+                  <a:rPr sz="1800">
+                    <a:latin typeface="Courier"/>
+                  </a:rPr>
+                  <a:t>##</a:t>
+                </a:r>
+                <a:r>
+                  <a:rPr/>
+                  <a:t>, </a:t>
+                </a:r>
+                <a:r>
+                  <a:rPr sz="1800">
+                    <a:latin typeface="Courier"/>
+                  </a:rPr>
+                  <a:t>###</a:t>
+                </a:r>
+                <a:r>
+                  <a:rPr/>
+                  <a:t>, </a:t>
+                </a:r>
+                <a:r>
+                  <a:rPr sz="1800">
+                    <a:latin typeface="Courier"/>
+                  </a:rPr>
+                  <a:t>####</a:t>
+                </a:r>
+                <a:r>
+                  <a:rPr/>
+                  <a:t>, …)</a:t>
+                </a:r>
+              </a:p>
+              <a:p>
+                <a:pPr lvl="1"/>
+                <a:r>
+                  <a:rPr/>
+                  <a:t>Create ordered lists with 1., 2., 3., … and unordered lists with </a:t>
+                </a:r>
+                <a:r>
+                  <a:rPr sz="1800">
+                    <a:latin typeface="Courier"/>
+                  </a:rPr>
+                  <a:t>*</a:t>
+                </a:r>
+                <a:r>
+                  <a:rPr/>
+                  <a:t>, </a:t>
+                </a:r>
+                <a:r>
+                  <a:rPr sz="1800">
+                    <a:latin typeface="Courier"/>
+                  </a:rPr>
+                  <a:t>-</a:t>
+                </a:r>
+                <a:r>
+                  <a:rPr/>
+                  <a:t>, or </a:t>
+                </a:r>
+                <a:r>
+                  <a:rPr sz="1800">
+                    <a:latin typeface="Courier"/>
+                  </a:rPr>
+                  <a:t>+</a:t>
+                </a:r>
+              </a:p>
+              <a:p>
+                <a:pPr lvl="1"/>
+                <a:r>
+                  <a:rPr/>
+                  <a:t>Create footnotes with </a:t>
+                </a:r>
+                <a:r>
+                  <a:rPr sz="1800">
+                    <a:latin typeface="Courier"/>
+                  </a:rPr>
+                  <a:t>^[]</a:t>
+                </a:r>
+                <a:r>
+                  <a:rPr baseline="30000">
+                    <a:hlinkClick r:id="rId3" action="ppaction://hlinksldjump"/>
+                  </a:rPr>
+                  <a:t>2</a:t>
+                </a:r>
+              </a:p>
+              <a:p>
+                <a:pPr lvl="1"/>
+                <a:r>
+                  <a:rPr/>
+                  <a:t>Create math equations with LaTeX syntax: </a:t>
+                </a:r>
+                <a14:m>
+                  <m:oMath xmlns:m="http://schemas.openxmlformats.org/officeDocument/2006/math">
+                    <m:r>
+                      <m:t>f</m:t>
+                    </m:r>
+                    <m:r>
+                      <m:t>(</m:t>
+                    </m:r>
+                    <m:r>
+                      <m:t>k</m:t>
+                    </m:r>
+                    <m:r>
+                      <m:t>)</m:t>
+                    </m:r>
+                    <m:r>
+                      <m:t>=</m:t>
+                    </m:r>
+                    <m:d>
+                      <m:dPr>
+                        <m:begChr m:val="("/>
+                        <m:endChr m:val=")"/>
+                        <m:grow/>
+                      </m:dPr>
+                      <m:e>
+                        <m:f>
+                          <m:fPr>
+                            <m:type m:val="noBar"/>
+                          </m:fPr>
+                          <m:num>
+                            <m:r>
+                              <m:t>n</m:t>
+                            </m:r>
+                          </m:num>
+                          <m:den>
+                            <m:r>
+                              <m:t>k</m:t>
+                            </m:r>
+                          </m:den>
+                        </m:f>
+                      </m:e>
+                    </m:d>
+                    <m:sSup>
+                      <m:e>
+                        <m:r>
+                          <m:t>p</m:t>
+                        </m:r>
+                      </m:e>
+                      <m:sup>
+                        <m:r>
+                          <m:t>k</m:t>
+                        </m:r>
+                      </m:sup>
+                    </m:sSup>
+                    <m:r>
+                      <m:t>(</m:t>
+                    </m:r>
+                    <m:r>
+                      <m:t>1</m:t>
+                    </m:r>
+                    <m:r>
+                      <m:t>−</m:t>
+                    </m:r>
+                    <m:r>
+                      <m:t>p</m:t>
+                    </m:r>
+                    <m:sSup>
+                      <m:e>
+                        <m:r>
+                          <m:t>)</m:t>
+                        </m:r>
+                      </m:e>
+                      <m:sup>
+                        <m:r>
+                          <m:t>n</m:t>
+                        </m:r>
+                        <m:r>
+                          <m:t>−</m:t>
+                        </m:r>
+                        <m:r>
+                          <m:t>k</m:t>
+                        </m:r>
+                      </m:sup>
+                    </m:sSup>
+                  </m:oMath>
+                </a14:m>
+              </a:p>
+            </p:txBody>
+          </p:sp>
+        </mc:Choice>
+      </mc:AlternateContent>
     </p:spTree>
   </p:cSld>
 </p:sld>

</xml_diff>